<commit_message>
Updated version numbers on Human and KIB parts
</commit_message>
<xml_diff>
--- a/MDH.pptx
+++ b/MDH.pptx
@@ -3797,14 +3797,14 @@
           <p:nvPr>
             <p:extLst>
               <p:ext uri="{D42A27DB-BD31-4B8C-83A1-F6EECF244321}">
-                <p14:modId xmlns:p14="http://schemas.microsoft.com/office/powerpoint/2010/main" val="994801723"/>
+                <p14:modId xmlns:p14="http://schemas.microsoft.com/office/powerpoint/2010/main" val="3155791566"/>
               </p:ext>
             </p:extLst>
           </p:nvPr>
         </p:nvGraphicFramePr>
         <p:xfrm>
           <a:off x="316030" y="932286"/>
-          <a:ext cx="8511940" cy="5606627"/>
+          <a:ext cx="8551910" cy="5438987"/>
         </p:xfrm>
         <a:graphic>
           <a:graphicData uri="http://schemas.openxmlformats.org/drawingml/2006/table">
@@ -3816,7 +3816,7 @@
                 <a:gridCol w="681927"/>
                 <a:gridCol w="700405"/>
                 <a:gridCol w="679239"/>
-                <a:gridCol w="646147"/>
+                <a:gridCol w="686117"/>
                 <a:gridCol w="564397"/>
                 <a:gridCol w="579099"/>
                 <a:gridCol w="614973"/>
@@ -4510,7 +4510,7 @@
                     <a:bodyPr/>
                     <a:lstStyle/>
                     <a:p>
-                      <a:endParaRPr lang="en-US" sz="1000"/>
+                      <a:endParaRPr lang="en-US" sz="1000" dirty="0"/>
                     </a:p>
                   </a:txBody>
                   <a:tcPr/>
@@ -4597,7 +4597,7 @@
                       <a:pPr algn="ctr"/>
                       <a:r>
                         <a:rPr lang="en-US" sz="1000" dirty="0" smtClean="0"/>
-                        <a:t>1.0</a:t>
+                        <a:t>1.1</a:t>
                       </a:r>
                       <a:endParaRPr lang="en-US" sz="1000" dirty="0"/>
                     </a:p>
@@ -4680,7 +4680,7 @@
                       <a:pPr algn="ctr"/>
                       <a:r>
                         <a:rPr lang="en-US" sz="1000" dirty="0" smtClean="0"/>
-                        <a:t>1.0</a:t>
+                        <a:t>1.1</a:t>
                       </a:r>
                       <a:endParaRPr lang="en-US" sz="1000" dirty="0"/>
                     </a:p>
@@ -4868,7 +4868,7 @@
                       <a:pPr algn="ctr"/>
                       <a:r>
                         <a:rPr lang="en-US" sz="1000" dirty="0" smtClean="0"/>
-                        <a:t>1.0</a:t>
+                        <a:t>1.1</a:t>
                       </a:r>
                       <a:endParaRPr lang="en-US" sz="1000" dirty="0"/>
                     </a:p>
@@ -5127,7 +5127,7 @@
                       <a:pPr algn="ctr"/>
                       <a:r>
                         <a:rPr lang="en-US" sz="1000" dirty="0" smtClean="0"/>
-                        <a:t>1.0</a:t>
+                        <a:t>1.1</a:t>
                       </a:r>
                       <a:endParaRPr lang="en-US" sz="1000" dirty="0"/>
                     </a:p>
@@ -5390,7 +5390,7 @@
                       <a:pPr algn="ctr"/>
                       <a:r>
                         <a:rPr lang="en-US" sz="1000" dirty="0" smtClean="0"/>
-                        <a:t>1.0</a:t>
+                        <a:t>1.1</a:t>
                       </a:r>
                       <a:endParaRPr lang="en-US" sz="1000" dirty="0"/>
                     </a:p>
@@ -5653,26 +5653,10 @@
                     <a:bodyPr/>
                     <a:lstStyle/>
                     <a:p>
-                      <a:pPr marL="0" marR="0" indent="0" algn="ctr" defTabSz="914400" rtl="0" eaLnBrk="1" fontAlgn="auto" latinLnBrk="0" hangingPunct="1">
-                        <a:lnSpc>
-                          <a:spcPct val="100000"/>
-                        </a:lnSpc>
-                        <a:spcBef>
-                          <a:spcPts val="0"/>
-                        </a:spcBef>
-                        <a:spcAft>
-                          <a:spcPts val="0"/>
-                        </a:spcAft>
-                        <a:buClrTx/>
-                        <a:buSzTx/>
-                        <a:buFontTx/>
-                        <a:buNone/>
-                        <a:tabLst/>
-                        <a:defRPr/>
-                      </a:pPr>
-                      <a:r>
-                        <a:rPr lang="en-US" sz="1000" dirty="0" smtClean="0"/>
-                        <a:t>1.0</a:t>
+                      <a:pPr algn="ctr"/>
+                      <a:r>
+                        <a:rPr lang="en-US" sz="1000" smtClean="0"/>
+                        <a:t>1.1</a:t>
                       </a:r>
                     </a:p>
                     <a:p>
@@ -5690,7 +5674,7 @@
                       <a:pPr algn="ctr"/>
                       <a:r>
                         <a:rPr lang="en-US" sz="1000" dirty="0" smtClean="0"/>
-                        <a:t>3.0 </a:t>
+                        <a:t>3.0 R </a:t>
                       </a:r>
                       <a:endParaRPr lang="en-US" sz="1000" dirty="0"/>
                     </a:p>
@@ -7253,20 +7237,12 @@
             <a:p>
               <a:pPr algn="ctr"/>
               <a:r>
-                <a:rPr lang="en-US" sz="1200" dirty="0" err="1" smtClean="0">
-                  <a:solidFill>
-                    <a:schemeClr val="tx1"/>
-                  </a:solidFill>
-                </a:rPr>
-                <a:t>Human+KIB</a:t>
-              </a:r>
-              <a:r>
                 <a:rPr lang="en-US" sz="1200" dirty="0" smtClean="0">
                   <a:solidFill>
                     <a:schemeClr val="tx1"/>
                   </a:solidFill>
                 </a:rPr>
-                <a:t> </a:t>
+                <a:t>Human + KIB </a:t>
               </a:r>
               <a:r>
                 <a:rPr lang="en-US" sz="1200" dirty="0" smtClean="0">
@@ -7773,7 +7749,7 @@
         <p:spPr>
           <a:xfrm>
             <a:off x="115202" y="5858794"/>
-            <a:ext cx="3340786" cy="738664"/>
+            <a:ext cx="3770519" cy="738664"/>
           </a:xfrm>
           <a:prstGeom prst="rect">
             <a:avLst/>
@@ -7798,21 +7774,22 @@
           <a:p>
             <a:r>
               <a:rPr lang="en-US" sz="1400" dirty="0" smtClean="0"/>
-              <a:t>Land: land related processes</a:t>
-            </a:r>
-          </a:p>
-          <a:p>
+              <a:t>Land: </a:t>
+            </a:r>
             <a:r>
               <a:rPr lang="en-US" sz="1400" dirty="0" smtClean="0"/>
-              <a:t>KIB</a:t>
+              <a:t>land processes with </a:t>
             </a:r>
             <a:r>
               <a:rPr lang="en-US" sz="1400" dirty="0" smtClean="0"/>
-              <a:t>: </a:t>
-            </a:r>
+              <a:t>climate and vegetation</a:t>
+            </a:r>
+            <a:endParaRPr lang="en-US" sz="1400" dirty="0" smtClean="0"/>
+          </a:p>
+          <a:p>
             <a:r>
               <a:rPr lang="en-US" sz="1400" dirty="0" smtClean="0"/>
-              <a:t>Interactions between Human and Land</a:t>
+              <a:t>KIB: Interactions between Human and Land</a:t>
             </a:r>
           </a:p>
         </p:txBody>
@@ -9416,15 +9393,7 @@
                   <a:schemeClr val="tx1"/>
                 </a:solidFill>
               </a:rPr>
-              <a:t>Human+ </a:t>
-            </a:r>
-            <a:r>
-              <a:rPr lang="en-US" sz="1200" dirty="0" smtClean="0">
-                <a:solidFill>
-                  <a:schemeClr val="tx1"/>
-                </a:solidFill>
-              </a:rPr>
-              <a:t>KIB 2.0</a:t>
+              <a:t>Human+ KIB 2.0</a:t>
             </a:r>
             <a:endParaRPr lang="en-US" sz="1200" dirty="0">
               <a:solidFill>
@@ -9516,23 +9485,7 @@
                   <a:schemeClr val="tx1"/>
                 </a:solidFill>
               </a:rPr>
-              <a:t>Human + </a:t>
-            </a:r>
-            <a:r>
-              <a:rPr lang="en-US" sz="1200" dirty="0" smtClean="0">
-                <a:solidFill>
-                  <a:schemeClr val="tx1"/>
-                </a:solidFill>
-              </a:rPr>
-              <a:t>KIB</a:t>
-            </a:r>
-            <a:r>
-              <a:rPr lang="en-US" sz="1200" dirty="0" smtClean="0">
-                <a:solidFill>
-                  <a:schemeClr val="tx1"/>
-                </a:solidFill>
-              </a:rPr>
-              <a:t> </a:t>
+              <a:t>Human + KIB </a:t>
             </a:r>
             <a:r>
               <a:rPr lang="en-US" sz="1200" dirty="0">

</xml_diff>

<commit_message>
Updated Slide #5 and added Slide #8.
</commit_message>
<xml_diff>
--- a/MDH.pptx
+++ b/MDH.pptx
@@ -5,16 +5,17 @@
     <p:sldMasterId id="2147483660" r:id="rId1"/>
   </p:sldMasterIdLst>
   <p:notesMasterIdLst>
-    <p:notesMasterId r:id="rId9"/>
+    <p:notesMasterId r:id="rId10"/>
   </p:notesMasterIdLst>
   <p:sldIdLst>
     <p:sldId id="256" r:id="rId2"/>
     <p:sldId id="257" r:id="rId3"/>
     <p:sldId id="258" r:id="rId4"/>
     <p:sldId id="259" r:id="rId5"/>
-    <p:sldId id="261" r:id="rId6"/>
+    <p:sldId id="263" r:id="rId6"/>
     <p:sldId id="260" r:id="rId7"/>
     <p:sldId id="262" r:id="rId8"/>
+    <p:sldId id="264" r:id="rId9"/>
   </p:sldIdLst>
   <p:sldSz cx="9144000" cy="6858000" type="screen4x3"/>
   <p:notesSz cx="7010400" cy="9236075"/>
@@ -203,7 +204,7 @@
           <a:p>
             <a:fld id="{196709AC-FC2E-4BF6-8D2C-6C61CA027DC1}" type="datetimeFigureOut">
               <a:rPr lang="en-US" smtClean="0"/>
-              <a:t>6/20/2016</a:t>
+              <a:t>6/22/2016</a:t>
             </a:fld>
             <a:endParaRPr lang="en-US"/>
           </a:p>
@@ -686,7 +687,7 @@
           <a:p>
             <a:fld id="{1A18742E-3986-419B-AAAB-707D01EF3526}" type="datetime1">
               <a:rPr lang="en-US" smtClean="0"/>
-              <a:t>6/20/2016</a:t>
+              <a:t>6/22/2016</a:t>
             </a:fld>
             <a:endParaRPr lang="en-US"/>
           </a:p>
@@ -856,7 +857,7 @@
           <a:p>
             <a:fld id="{D595EB35-2AC0-41E0-930C-25D80640CC50}" type="datetime1">
               <a:rPr lang="en-US" smtClean="0"/>
-              <a:t>6/20/2016</a:t>
+              <a:t>6/22/2016</a:t>
             </a:fld>
             <a:endParaRPr lang="en-US"/>
           </a:p>
@@ -1036,7 +1037,7 @@
           <a:p>
             <a:fld id="{F34EAE34-AEBE-4C4F-9BA3-1A6F6D14BDDC}" type="datetime1">
               <a:rPr lang="en-US" smtClean="0"/>
-              <a:t>6/20/2016</a:t>
+              <a:t>6/22/2016</a:t>
             </a:fld>
             <a:endParaRPr lang="en-US"/>
           </a:p>
@@ -1206,7 +1207,7 @@
           <a:p>
             <a:fld id="{2095AD4C-B5EF-4041-9271-A2A5C5E6220B}" type="datetime1">
               <a:rPr lang="en-US" smtClean="0"/>
-              <a:t>6/20/2016</a:t>
+              <a:t>6/22/2016</a:t>
             </a:fld>
             <a:endParaRPr lang="en-US"/>
           </a:p>
@@ -1450,7 +1451,7 @@
           <a:p>
             <a:fld id="{60EAA367-1030-4DFD-9E7F-A96A5D5751DF}" type="datetime1">
               <a:rPr lang="en-US" smtClean="0"/>
-              <a:t>6/20/2016</a:t>
+              <a:t>6/22/2016</a:t>
             </a:fld>
             <a:endParaRPr lang="en-US"/>
           </a:p>
@@ -1682,7 +1683,7 @@
           <a:p>
             <a:fld id="{61D02A1E-D37A-44D7-AD02-E46859AAB817}" type="datetime1">
               <a:rPr lang="en-US" smtClean="0"/>
-              <a:t>6/20/2016</a:t>
+              <a:t>6/22/2016</a:t>
             </a:fld>
             <a:endParaRPr lang="en-US"/>
           </a:p>
@@ -2049,7 +2050,7 @@
           <a:p>
             <a:fld id="{365E885D-9505-411C-899B-667B1377DE43}" type="datetime1">
               <a:rPr lang="en-US" smtClean="0"/>
-              <a:t>6/20/2016</a:t>
+              <a:t>6/22/2016</a:t>
             </a:fld>
             <a:endParaRPr lang="en-US"/>
           </a:p>
@@ -2167,7 +2168,7 @@
           <a:p>
             <a:fld id="{C17691AC-1A9C-4CC0-86D2-4478B7A00F03}" type="datetime1">
               <a:rPr lang="en-US" smtClean="0"/>
-              <a:t>6/20/2016</a:t>
+              <a:t>6/22/2016</a:t>
             </a:fld>
             <a:endParaRPr lang="en-US"/>
           </a:p>
@@ -2262,7 +2263,7 @@
           <a:p>
             <a:fld id="{A6AEA082-C9CE-49BC-A53D-53E47D6469E9}" type="datetime1">
               <a:rPr lang="en-US" smtClean="0"/>
-              <a:t>6/20/2016</a:t>
+              <a:t>6/22/2016</a:t>
             </a:fld>
             <a:endParaRPr lang="en-US"/>
           </a:p>
@@ -2539,7 +2540,7 @@
           <a:p>
             <a:fld id="{67EB36F3-B534-4F8A-82F2-1363AA134D86}" type="datetime1">
               <a:rPr lang="en-US" smtClean="0"/>
-              <a:t>6/20/2016</a:t>
+              <a:t>6/22/2016</a:t>
             </a:fld>
             <a:endParaRPr lang="en-US"/>
           </a:p>
@@ -2796,7 +2797,7 @@
           <a:p>
             <a:fld id="{AA885096-A76C-411A-812C-8C0BC44FF8D3}" type="datetime1">
               <a:rPr lang="en-US" smtClean="0"/>
-              <a:t>6/20/2016</a:t>
+              <a:t>6/22/2016</a:t>
             </a:fld>
             <a:endParaRPr lang="en-US"/>
           </a:p>
@@ -3009,7 +3010,7 @@
           <a:p>
             <a:fld id="{4B1782B5-F21E-4619-AD36-E9E75BE1CB2F}" type="datetime1">
               <a:rPr lang="en-US" smtClean="0"/>
-              <a:t>6/20/2016</a:t>
+              <a:t>6/22/2016</a:t>
             </a:fld>
             <a:endParaRPr lang="en-US"/>
           </a:p>
@@ -7242,15 +7243,7 @@
                     <a:schemeClr val="tx1"/>
                   </a:solidFill>
                 </a:rPr>
-                <a:t>Human + KIB </a:t>
-              </a:r>
-              <a:r>
-                <a:rPr lang="en-US" sz="1200" dirty="0" smtClean="0">
-                  <a:solidFill>
-                    <a:schemeClr val="tx1"/>
-                  </a:solidFill>
-                </a:rPr>
-                <a:t>1.1</a:t>
+                <a:t>Human + KIB 1.1</a:t>
               </a:r>
               <a:endParaRPr lang="en-US" sz="1200" dirty="0">
                 <a:solidFill>
@@ -7774,17 +7767,8 @@
           <a:p>
             <a:r>
               <a:rPr lang="en-US" sz="1400" dirty="0" smtClean="0"/>
-              <a:t>Land: </a:t>
-            </a:r>
-            <a:r>
-              <a:rPr lang="en-US" sz="1400" dirty="0" smtClean="0"/>
-              <a:t>land processes with </a:t>
-            </a:r>
-            <a:r>
-              <a:rPr lang="en-US" sz="1400" dirty="0" smtClean="0"/>
-              <a:t>climate and vegetation</a:t>
-            </a:r>
-            <a:endParaRPr lang="en-US" sz="1400" dirty="0" smtClean="0"/>
+              <a:t>Land: land processes with climate and vegetation</a:t>
+            </a:r>
           </a:p>
           <a:p>
             <a:r>
@@ -7794,10 +7778,445 @@
           </a:p>
         </p:txBody>
       </p:sp>
+      <p:sp>
+        <p:nvSpPr>
+          <p:cNvPr id="31" name="Oval 30"/>
+          <p:cNvSpPr/>
+          <p:nvPr/>
+        </p:nvSpPr>
+        <p:spPr>
+          <a:xfrm>
+            <a:off x="5588009" y="5385358"/>
+            <a:ext cx="201976" cy="201976"/>
+          </a:xfrm>
+          <a:prstGeom prst="ellipse">
+            <a:avLst/>
+          </a:prstGeom>
+          <a:solidFill>
+            <a:srgbClr val="FF0000"/>
+          </a:solidFill>
+          <a:ln>
+            <a:solidFill>
+              <a:srgbClr val="C00000"/>
+            </a:solidFill>
+          </a:ln>
+        </p:spPr>
+        <p:style>
+          <a:lnRef idx="2">
+            <a:schemeClr val="accent1">
+              <a:shade val="50000"/>
+            </a:schemeClr>
+          </a:lnRef>
+          <a:fillRef idx="1">
+            <a:schemeClr val="accent1"/>
+          </a:fillRef>
+          <a:effectRef idx="0">
+            <a:schemeClr val="accent1"/>
+          </a:effectRef>
+          <a:fontRef idx="minor">
+            <a:schemeClr val="lt1"/>
+          </a:fontRef>
+        </p:style>
+        <p:txBody>
+          <a:bodyPr lIns="0" rIns="0" rtlCol="0" anchor="ctr"/>
+          <a:lstStyle/>
+          <a:p>
+            <a:pPr algn="ctr"/>
+            <a:r>
+              <a:rPr lang="en-US" sz="1200" dirty="0" smtClean="0">
+                <a:solidFill>
+                  <a:schemeClr val="bg1"/>
+                </a:solidFill>
+              </a:rPr>
+              <a:t>1</a:t>
+            </a:r>
+            <a:endParaRPr lang="en-US" sz="1200" dirty="0">
+              <a:solidFill>
+                <a:schemeClr val="bg1"/>
+              </a:solidFill>
+            </a:endParaRPr>
+          </a:p>
+        </p:txBody>
+      </p:sp>
+      <p:sp>
+        <p:nvSpPr>
+          <p:cNvPr id="34" name="Oval 33"/>
+          <p:cNvSpPr/>
+          <p:nvPr/>
+        </p:nvSpPr>
+        <p:spPr>
+          <a:xfrm>
+            <a:off x="5967798" y="5385357"/>
+            <a:ext cx="201976" cy="201976"/>
+          </a:xfrm>
+          <a:prstGeom prst="ellipse">
+            <a:avLst/>
+          </a:prstGeom>
+          <a:solidFill>
+            <a:srgbClr val="FF0000"/>
+          </a:solidFill>
+          <a:ln>
+            <a:solidFill>
+              <a:srgbClr val="C00000"/>
+            </a:solidFill>
+          </a:ln>
+        </p:spPr>
+        <p:style>
+          <a:lnRef idx="2">
+            <a:schemeClr val="accent1">
+              <a:shade val="50000"/>
+            </a:schemeClr>
+          </a:lnRef>
+          <a:fillRef idx="1">
+            <a:schemeClr val="accent1"/>
+          </a:fillRef>
+          <a:effectRef idx="0">
+            <a:schemeClr val="accent1"/>
+          </a:effectRef>
+          <a:fontRef idx="minor">
+            <a:schemeClr val="lt1"/>
+          </a:fontRef>
+        </p:style>
+        <p:txBody>
+          <a:bodyPr lIns="0" rIns="0" rtlCol="0" anchor="ctr"/>
+          <a:lstStyle/>
+          <a:p>
+            <a:pPr algn="ctr"/>
+            <a:r>
+              <a:rPr lang="en-US" sz="1200" dirty="0" smtClean="0">
+                <a:solidFill>
+                  <a:schemeClr val="bg1"/>
+                </a:solidFill>
+              </a:rPr>
+              <a:t>2</a:t>
+            </a:r>
+            <a:endParaRPr lang="en-US" sz="1200" dirty="0">
+              <a:solidFill>
+                <a:schemeClr val="bg1"/>
+              </a:solidFill>
+            </a:endParaRPr>
+          </a:p>
+        </p:txBody>
+      </p:sp>
+      <p:sp>
+        <p:nvSpPr>
+          <p:cNvPr id="35" name="Oval 34"/>
+          <p:cNvSpPr/>
+          <p:nvPr/>
+        </p:nvSpPr>
+        <p:spPr>
+          <a:xfrm>
+            <a:off x="6374196" y="5385357"/>
+            <a:ext cx="201976" cy="201976"/>
+          </a:xfrm>
+          <a:prstGeom prst="ellipse">
+            <a:avLst/>
+          </a:prstGeom>
+          <a:solidFill>
+            <a:srgbClr val="FF0000"/>
+          </a:solidFill>
+          <a:ln>
+            <a:solidFill>
+              <a:srgbClr val="C00000"/>
+            </a:solidFill>
+          </a:ln>
+        </p:spPr>
+        <p:style>
+          <a:lnRef idx="2">
+            <a:schemeClr val="accent1">
+              <a:shade val="50000"/>
+            </a:schemeClr>
+          </a:lnRef>
+          <a:fillRef idx="1">
+            <a:schemeClr val="accent1"/>
+          </a:fillRef>
+          <a:effectRef idx="0">
+            <a:schemeClr val="accent1"/>
+          </a:effectRef>
+          <a:fontRef idx="minor">
+            <a:schemeClr val="lt1"/>
+          </a:fontRef>
+        </p:style>
+        <p:txBody>
+          <a:bodyPr lIns="0" rIns="0" rtlCol="0" anchor="ctr"/>
+          <a:lstStyle/>
+          <a:p>
+            <a:pPr algn="ctr"/>
+            <a:r>
+              <a:rPr lang="en-US" sz="1200" dirty="0" smtClean="0">
+                <a:solidFill>
+                  <a:schemeClr val="bg1"/>
+                </a:solidFill>
+              </a:rPr>
+              <a:t>…</a:t>
+            </a:r>
+            <a:endParaRPr lang="en-US" sz="1200" dirty="0">
+              <a:solidFill>
+                <a:schemeClr val="bg1"/>
+              </a:solidFill>
+            </a:endParaRPr>
+          </a:p>
+        </p:txBody>
+      </p:sp>
+      <p:sp>
+        <p:nvSpPr>
+          <p:cNvPr id="36" name="Oval 35"/>
+          <p:cNvSpPr/>
+          <p:nvPr/>
+        </p:nvSpPr>
+        <p:spPr>
+          <a:xfrm>
+            <a:off x="6791486" y="5385357"/>
+            <a:ext cx="201976" cy="201976"/>
+          </a:xfrm>
+          <a:prstGeom prst="ellipse">
+            <a:avLst/>
+          </a:prstGeom>
+          <a:solidFill>
+            <a:srgbClr val="FF0000"/>
+          </a:solidFill>
+          <a:ln>
+            <a:solidFill>
+              <a:srgbClr val="C00000"/>
+            </a:solidFill>
+          </a:ln>
+        </p:spPr>
+        <p:style>
+          <a:lnRef idx="2">
+            <a:schemeClr val="accent1">
+              <a:shade val="50000"/>
+            </a:schemeClr>
+          </a:lnRef>
+          <a:fillRef idx="1">
+            <a:schemeClr val="accent1"/>
+          </a:fillRef>
+          <a:effectRef idx="0">
+            <a:schemeClr val="accent1"/>
+          </a:effectRef>
+          <a:fontRef idx="minor">
+            <a:schemeClr val="lt1"/>
+          </a:fontRef>
+        </p:style>
+        <p:txBody>
+          <a:bodyPr lIns="0" rIns="0" rtlCol="0" anchor="ctr"/>
+          <a:lstStyle/>
+          <a:p>
+            <a:pPr algn="ctr"/>
+            <a:r>
+              <a:rPr lang="en-US" sz="1200" dirty="0" smtClean="0">
+                <a:solidFill>
+                  <a:schemeClr val="bg1"/>
+                </a:solidFill>
+              </a:rPr>
+              <a:t>m</a:t>
+            </a:r>
+            <a:endParaRPr lang="en-US" sz="1200" dirty="0">
+              <a:solidFill>
+                <a:schemeClr val="bg1"/>
+              </a:solidFill>
+            </a:endParaRPr>
+          </a:p>
+        </p:txBody>
+      </p:sp>
+      <p:cxnSp>
+        <p:nvCxnSpPr>
+          <p:cNvPr id="3" name="Straight Arrow Connector 2"/>
+          <p:cNvCxnSpPr>
+            <a:stCxn id="31" idx="6"/>
+            <a:endCxn id="34" idx="2"/>
+          </p:cNvCxnSpPr>
+          <p:nvPr/>
+        </p:nvCxnSpPr>
+        <p:spPr>
+          <a:xfrm flipV="1">
+            <a:off x="5789985" y="5486345"/>
+            <a:ext cx="177813" cy="1"/>
+          </a:xfrm>
+          <a:prstGeom prst="straightConnector1">
+            <a:avLst/>
+          </a:prstGeom>
+          <a:ln>
+            <a:solidFill>
+              <a:srgbClr val="C00000"/>
+            </a:solidFill>
+            <a:tailEnd type="triangle"/>
+          </a:ln>
+        </p:spPr>
+        <p:style>
+          <a:lnRef idx="1">
+            <a:schemeClr val="accent1"/>
+          </a:lnRef>
+          <a:fillRef idx="0">
+            <a:schemeClr val="accent1"/>
+          </a:fillRef>
+          <a:effectRef idx="0">
+            <a:schemeClr val="accent1"/>
+          </a:effectRef>
+          <a:fontRef idx="minor">
+            <a:schemeClr val="tx1"/>
+          </a:fontRef>
+        </p:style>
+      </p:cxnSp>
+      <p:cxnSp>
+        <p:nvCxnSpPr>
+          <p:cNvPr id="9" name="Straight Arrow Connector 8"/>
+          <p:cNvCxnSpPr>
+            <a:stCxn id="34" idx="6"/>
+            <a:endCxn id="35" idx="2"/>
+          </p:cNvCxnSpPr>
+          <p:nvPr/>
+        </p:nvCxnSpPr>
+        <p:spPr>
+          <a:xfrm>
+            <a:off x="6169774" y="5486345"/>
+            <a:ext cx="204422" cy="0"/>
+          </a:xfrm>
+          <a:prstGeom prst="straightConnector1">
+            <a:avLst/>
+          </a:prstGeom>
+          <a:ln>
+            <a:solidFill>
+              <a:srgbClr val="C00000"/>
+            </a:solidFill>
+            <a:tailEnd type="triangle"/>
+          </a:ln>
+        </p:spPr>
+        <p:style>
+          <a:lnRef idx="1">
+            <a:schemeClr val="accent1"/>
+          </a:lnRef>
+          <a:fillRef idx="0">
+            <a:schemeClr val="accent1"/>
+          </a:fillRef>
+          <a:effectRef idx="0">
+            <a:schemeClr val="accent1"/>
+          </a:effectRef>
+          <a:fontRef idx="minor">
+            <a:schemeClr val="tx1"/>
+          </a:fontRef>
+        </p:style>
+      </p:cxnSp>
+      <p:cxnSp>
+        <p:nvCxnSpPr>
+          <p:cNvPr id="24" name="Straight Arrow Connector 23"/>
+          <p:cNvCxnSpPr>
+            <a:stCxn id="35" idx="6"/>
+            <a:endCxn id="36" idx="2"/>
+          </p:cNvCxnSpPr>
+          <p:nvPr/>
+        </p:nvCxnSpPr>
+        <p:spPr>
+          <a:xfrm>
+            <a:off x="6576172" y="5486345"/>
+            <a:ext cx="215314" cy="0"/>
+          </a:xfrm>
+          <a:prstGeom prst="straightConnector1">
+            <a:avLst/>
+          </a:prstGeom>
+          <a:ln>
+            <a:solidFill>
+              <a:srgbClr val="C00000"/>
+            </a:solidFill>
+            <a:tailEnd type="triangle"/>
+          </a:ln>
+        </p:spPr>
+        <p:style>
+          <a:lnRef idx="1">
+            <a:schemeClr val="accent1"/>
+          </a:lnRef>
+          <a:fillRef idx="0">
+            <a:schemeClr val="accent1"/>
+          </a:fillRef>
+          <a:effectRef idx="0">
+            <a:schemeClr val="accent1"/>
+          </a:effectRef>
+          <a:fontRef idx="minor">
+            <a:schemeClr val="tx1"/>
+          </a:fontRef>
+        </p:style>
+      </p:cxnSp>
+      <p:cxnSp>
+        <p:nvCxnSpPr>
+          <p:cNvPr id="43" name="Straight Connector 42"/>
+          <p:cNvCxnSpPr>
+            <a:stCxn id="28" idx="2"/>
+            <a:endCxn id="31" idx="1"/>
+          </p:cNvCxnSpPr>
+          <p:nvPr/>
+        </p:nvCxnSpPr>
+        <p:spPr>
+          <a:xfrm flipH="1">
+            <a:off x="5617588" y="4847168"/>
+            <a:ext cx="433958" cy="567769"/>
+          </a:xfrm>
+          <a:prstGeom prst="line">
+            <a:avLst/>
+          </a:prstGeom>
+          <a:ln>
+            <a:solidFill>
+              <a:srgbClr val="C00000"/>
+            </a:solidFill>
+            <a:prstDash val="lgDash"/>
+          </a:ln>
+        </p:spPr>
+        <p:style>
+          <a:lnRef idx="1">
+            <a:schemeClr val="accent1"/>
+          </a:lnRef>
+          <a:fillRef idx="0">
+            <a:schemeClr val="accent1"/>
+          </a:fillRef>
+          <a:effectRef idx="0">
+            <a:schemeClr val="accent1"/>
+          </a:effectRef>
+          <a:fontRef idx="minor">
+            <a:schemeClr val="tx1"/>
+          </a:fontRef>
+        </p:style>
+      </p:cxnSp>
+      <p:cxnSp>
+        <p:nvCxnSpPr>
+          <p:cNvPr id="45" name="Straight Connector 44"/>
+          <p:cNvCxnSpPr>
+            <a:stCxn id="28" idx="6"/>
+            <a:endCxn id="36" idx="7"/>
+          </p:cNvCxnSpPr>
+          <p:nvPr/>
+        </p:nvCxnSpPr>
+        <p:spPr>
+          <a:xfrm>
+            <a:off x="6568012" y="4847168"/>
+            <a:ext cx="395871" cy="567768"/>
+          </a:xfrm>
+          <a:prstGeom prst="line">
+            <a:avLst/>
+          </a:prstGeom>
+          <a:ln>
+            <a:solidFill>
+              <a:srgbClr val="C00000"/>
+            </a:solidFill>
+            <a:prstDash val="lgDash"/>
+          </a:ln>
+        </p:spPr>
+        <p:style>
+          <a:lnRef idx="1">
+            <a:schemeClr val="accent1"/>
+          </a:lnRef>
+          <a:fillRef idx="0">
+            <a:schemeClr val="accent1"/>
+          </a:fillRef>
+          <a:effectRef idx="0">
+            <a:schemeClr val="accent1"/>
+          </a:effectRef>
+          <a:fontRef idx="minor">
+            <a:schemeClr val="tx1"/>
+          </a:fontRef>
+        </p:style>
+      </p:cxnSp>
     </p:spTree>
     <p:extLst>
       <p:ext uri="{BB962C8B-B14F-4D97-AF65-F5344CB8AC3E}">
-        <p14:creationId xmlns:p14="http://schemas.microsoft.com/office/powerpoint/2010/main" val="3490611764"/>
+        <p14:creationId xmlns:p14="http://schemas.microsoft.com/office/powerpoint/2010/main" val="4108871704"/>
       </p:ext>
     </p:extLst>
   </p:cSld>
@@ -9678,6 +10097,106 @@
     <p:extLst>
       <p:ext uri="{BB962C8B-B14F-4D97-AF65-F5344CB8AC3E}">
         <p14:creationId xmlns:p14="http://schemas.microsoft.com/office/powerpoint/2010/main" val="3205544227"/>
+      </p:ext>
+    </p:extLst>
+  </p:cSld>
+  <p:clrMapOvr>
+    <a:masterClrMapping/>
+  </p:clrMapOvr>
+</p:sld>
+</file>
+
+<file path=ppt/slides/slide8.xml><?xml version="1.0" encoding="utf-8"?>
+<p:sld xmlns:a="http://schemas.openxmlformats.org/drawingml/2006/main" xmlns:r="http://schemas.openxmlformats.org/officeDocument/2006/relationships" xmlns:p="http://schemas.openxmlformats.org/presentationml/2006/main">
+  <p:cSld>
+    <p:spTree>
+      <p:nvGrpSpPr>
+        <p:cNvPr id="1" name=""/>
+        <p:cNvGrpSpPr/>
+        <p:nvPr/>
+      </p:nvGrpSpPr>
+      <p:grpSpPr>
+        <a:xfrm>
+          <a:off x="0" y="0"/>
+          <a:ext cx="0" cy="0"/>
+          <a:chOff x="0" y="0"/>
+          <a:chExt cx="0" cy="0"/>
+        </a:xfrm>
+      </p:grpSpPr>
+      <p:sp>
+        <p:nvSpPr>
+          <p:cNvPr id="2" name="Title 1"/>
+          <p:cNvSpPr>
+            <a:spLocks noGrp="1"/>
+          </p:cNvSpPr>
+          <p:nvPr>
+            <p:ph type="title"/>
+          </p:nvPr>
+        </p:nvSpPr>
+        <p:spPr/>
+        <p:txBody>
+          <a:bodyPr/>
+          <a:lstStyle/>
+          <a:p>
+            <a:r>
+              <a:rPr lang="en-US" dirty="0" smtClean="0"/>
+              <a:t>MML: Parts and Whole</a:t>
+            </a:r>
+            <a:endParaRPr lang="en-US" dirty="0"/>
+          </a:p>
+        </p:txBody>
+      </p:sp>
+      <p:sp>
+        <p:nvSpPr>
+          <p:cNvPr id="3" name="Slide Number Placeholder 2"/>
+          <p:cNvSpPr>
+            <a:spLocks noGrp="1"/>
+          </p:cNvSpPr>
+          <p:nvPr>
+            <p:ph type="sldNum" sz="quarter" idx="12"/>
+          </p:nvPr>
+        </p:nvSpPr>
+        <p:spPr/>
+        <p:txBody>
+          <a:bodyPr/>
+          <a:lstStyle/>
+          <a:p>
+            <a:fld id="{FA2DEC7D-24FC-46AE-A9F5-2317EFB53DAF}" type="slidenum">
+              <a:rPr lang="en-US" smtClean="0"/>
+              <a:t>8</a:t>
+            </a:fld>
+            <a:endParaRPr lang="en-US"/>
+          </a:p>
+        </p:txBody>
+      </p:sp>
+      <p:pic>
+        <p:nvPicPr>
+          <p:cNvPr id="6" name="Picture 5"/>
+          <p:cNvPicPr>
+            <a:picLocks noChangeAspect="1"/>
+          </p:cNvPicPr>
+          <p:nvPr/>
+        </p:nvPicPr>
+        <p:blipFill>
+          <a:blip r:embed="rId2"/>
+          <a:stretch>
+            <a:fillRect/>
+          </a:stretch>
+        </p:blipFill>
+        <p:spPr>
+          <a:xfrm>
+            <a:off x="1079869" y="1657281"/>
+            <a:ext cx="6045097" cy="4017687"/>
+          </a:xfrm>
+          <a:prstGeom prst="rect">
+            <a:avLst/>
+          </a:prstGeom>
+        </p:spPr>
+      </p:pic>
+    </p:spTree>
+    <p:extLst>
+      <p:ext uri="{BB962C8B-B14F-4D97-AF65-F5344CB8AC3E}">
+        <p14:creationId xmlns:p14="http://schemas.microsoft.com/office/powerpoint/2010/main" val="1643585496"/>
       </p:ext>
     </p:extLst>
   </p:cSld>

</xml_diff>